<commit_message>
polishing first lecture, etc.
</commit_message>
<xml_diff>
--- a/week1/presentation_1.pptx
+++ b/week1/presentation_1.pptx
@@ -16,8 +16,9 @@
     <p:sldId id="266" r:id="rId10"/>
     <p:sldId id="264" r:id="rId11"/>
     <p:sldId id="267" r:id="rId12"/>
-    <p:sldId id="268" r:id="rId13"/>
-    <p:sldId id="262" r:id="rId14"/>
+    <p:sldId id="269" r:id="rId13"/>
+    <p:sldId id="268" r:id="rId14"/>
+    <p:sldId id="262" r:id="rId15"/>
   </p:sldIdLst>
   <p:sldSz cx="9144000" cy="6858000" type="screen4x3"/>
   <p:notesSz cx="6858000" cy="9144000"/>
@@ -300,7 +301,7 @@
           <a:p>
             <a:fld id="{90227CC5-C68A-4540-BD1A-E9B55CA4C0C5}" type="datetimeFigureOut">
               <a:rPr lang="en-US" smtClean="0"/>
-              <a:t>8/26/18</a:t>
+              <a:t>8/28/18</a:t>
             </a:fld>
             <a:endParaRPr lang="en-US"/>
           </a:p>
@@ -470,7 +471,7 @@
           <a:p>
             <a:fld id="{90227CC5-C68A-4540-BD1A-E9B55CA4C0C5}" type="datetimeFigureOut">
               <a:rPr lang="en-US" smtClean="0"/>
-              <a:t>8/26/18</a:t>
+              <a:t>8/28/18</a:t>
             </a:fld>
             <a:endParaRPr lang="en-US"/>
           </a:p>
@@ -650,7 +651,7 @@
           <a:p>
             <a:fld id="{90227CC5-C68A-4540-BD1A-E9B55CA4C0C5}" type="datetimeFigureOut">
               <a:rPr lang="en-US" smtClean="0"/>
-              <a:t>8/26/18</a:t>
+              <a:t>8/28/18</a:t>
             </a:fld>
             <a:endParaRPr lang="en-US"/>
           </a:p>
@@ -820,7 +821,7 @@
           <a:p>
             <a:fld id="{90227CC5-C68A-4540-BD1A-E9B55CA4C0C5}" type="datetimeFigureOut">
               <a:rPr lang="en-US" smtClean="0"/>
-              <a:t>8/26/18</a:t>
+              <a:t>8/28/18</a:t>
             </a:fld>
             <a:endParaRPr lang="en-US"/>
           </a:p>
@@ -1066,7 +1067,7 @@
           <a:p>
             <a:fld id="{90227CC5-C68A-4540-BD1A-E9B55CA4C0C5}" type="datetimeFigureOut">
               <a:rPr lang="en-US" smtClean="0"/>
-              <a:t>8/26/18</a:t>
+              <a:t>8/28/18</a:t>
             </a:fld>
             <a:endParaRPr lang="en-US"/>
           </a:p>
@@ -1354,7 +1355,7 @@
           <a:p>
             <a:fld id="{90227CC5-C68A-4540-BD1A-E9B55CA4C0C5}" type="datetimeFigureOut">
               <a:rPr lang="en-US" smtClean="0"/>
-              <a:t>8/26/18</a:t>
+              <a:t>8/28/18</a:t>
             </a:fld>
             <a:endParaRPr lang="en-US"/>
           </a:p>
@@ -1776,7 +1777,7 @@
           <a:p>
             <a:fld id="{90227CC5-C68A-4540-BD1A-E9B55CA4C0C5}" type="datetimeFigureOut">
               <a:rPr lang="en-US" smtClean="0"/>
-              <a:t>8/26/18</a:t>
+              <a:t>8/28/18</a:t>
             </a:fld>
             <a:endParaRPr lang="en-US"/>
           </a:p>
@@ -1894,7 +1895,7 @@
           <a:p>
             <a:fld id="{90227CC5-C68A-4540-BD1A-E9B55CA4C0C5}" type="datetimeFigureOut">
               <a:rPr lang="en-US" smtClean="0"/>
-              <a:t>8/26/18</a:t>
+              <a:t>8/28/18</a:t>
             </a:fld>
             <a:endParaRPr lang="en-US"/>
           </a:p>
@@ -1989,7 +1990,7 @@
           <a:p>
             <a:fld id="{90227CC5-C68A-4540-BD1A-E9B55CA4C0C5}" type="datetimeFigureOut">
               <a:rPr lang="en-US" smtClean="0"/>
-              <a:t>8/26/18</a:t>
+              <a:t>8/28/18</a:t>
             </a:fld>
             <a:endParaRPr lang="en-US"/>
           </a:p>
@@ -2266,7 +2267,7 @@
           <a:p>
             <a:fld id="{90227CC5-C68A-4540-BD1A-E9B55CA4C0C5}" type="datetimeFigureOut">
               <a:rPr lang="en-US" smtClean="0"/>
-              <a:t>8/26/18</a:t>
+              <a:t>8/28/18</a:t>
             </a:fld>
             <a:endParaRPr lang="en-US"/>
           </a:p>
@@ -2523,7 +2524,7 @@
           <a:p>
             <a:fld id="{90227CC5-C68A-4540-BD1A-E9B55CA4C0C5}" type="datetimeFigureOut">
               <a:rPr lang="en-US" smtClean="0"/>
-              <a:t>8/26/18</a:t>
+              <a:t>8/28/18</a:t>
             </a:fld>
             <a:endParaRPr lang="en-US"/>
           </a:p>
@@ -2736,7 +2737,7 @@
           <a:p>
             <a:fld id="{90227CC5-C68A-4540-BD1A-E9B55CA4C0C5}" type="datetimeFigureOut">
               <a:rPr lang="en-US" smtClean="0"/>
-              <a:t>8/26/18</a:t>
+              <a:t>8/28/18</a:t>
             </a:fld>
             <a:endParaRPr lang="en-US"/>
           </a:p>
@@ -3323,7 +3324,7 @@
           <a:bodyPr/>
           <a:lstStyle/>
           <a:p>
-            <a:endParaRPr lang="en-US"/>
+            <a:endParaRPr lang="en-US" dirty="0"/>
           </a:p>
         </p:txBody>
       </p:sp>
@@ -3372,7 +3373,11 @@
           <a:bodyPr/>
           <a:lstStyle/>
           <a:p>
-            <a:endParaRPr lang="en-US"/>
+            <a:r>
+              <a:rPr lang="en-US" dirty="0" smtClean="0"/>
+              <a:t>Belief</a:t>
+            </a:r>
+            <a:endParaRPr lang="en-US" dirty="0"/>
           </a:p>
         </p:txBody>
       </p:sp>
@@ -3391,7 +3396,185 @@
           <a:bodyPr/>
           <a:lstStyle/>
           <a:p>
-            <a:endParaRPr lang="en-US"/>
+            <a:r>
+              <a:rPr lang="en-US" dirty="0" smtClean="0"/>
+              <a:t>It is my belief that we can measure the efficiency of the decentralized communities by how fast they can incorporate progress in research into the design/implementation of their blockchain protocols; this requires fast protocol governance</a:t>
+            </a:r>
+            <a:r>
+              <a:rPr lang="mr-IN" dirty="0" smtClean="0"/>
+              <a:t>…</a:t>
+            </a:r>
+            <a:r>
+              <a:rPr lang="en-US" dirty="0" smtClean="0"/>
+              <a:t>need to communicate that different blockchains offer different value propositions (Bitcoin should prioritize backwards compatibility according to most)</a:t>
+            </a:r>
+            <a:endParaRPr lang="en-US" dirty="0"/>
+          </a:p>
+        </p:txBody>
+      </p:sp>
+    </p:spTree>
+    <p:extLst>
+      <p:ext uri="{BB962C8B-B14F-4D97-AF65-F5344CB8AC3E}">
+        <p14:creationId xmlns:p14="http://schemas.microsoft.com/office/powerpoint/2010/main" val="1341572324"/>
+      </p:ext>
+    </p:extLst>
+  </p:cSld>
+  <p:clrMapOvr>
+    <a:masterClrMapping/>
+  </p:clrMapOvr>
+</p:sld>
+</file>
+
+<file path=ppt/slides/slide13.xml><?xml version="1.0" encoding="utf-8"?>
+<p:sld xmlns:a="http://schemas.openxmlformats.org/drawingml/2006/main" xmlns:r="http://schemas.openxmlformats.org/officeDocument/2006/relationships" xmlns:p="http://schemas.openxmlformats.org/presentationml/2006/main">
+  <p:cSld>
+    <p:spTree>
+      <p:nvGrpSpPr>
+        <p:cNvPr id="1" name=""/>
+        <p:cNvGrpSpPr/>
+        <p:nvPr/>
+      </p:nvGrpSpPr>
+      <p:grpSpPr>
+        <a:xfrm>
+          <a:off x="0" y="0"/>
+          <a:ext cx="0" cy="0"/>
+          <a:chOff x="0" y="0"/>
+          <a:chExt cx="0" cy="0"/>
+        </a:xfrm>
+      </p:grpSpPr>
+      <p:sp>
+        <p:nvSpPr>
+          <p:cNvPr id="2" name="Title 1"/>
+          <p:cNvSpPr>
+            <a:spLocks noGrp="1"/>
+          </p:cNvSpPr>
+          <p:nvPr>
+            <p:ph type="title"/>
+          </p:nvPr>
+        </p:nvSpPr>
+        <p:spPr/>
+        <p:txBody>
+          <a:bodyPr>
+            <a:normAutofit fontScale="90000"/>
+          </a:bodyPr>
+          <a:lstStyle/>
+          <a:p>
+            <a:r>
+              <a:rPr lang="en-US" dirty="0" smtClean="0"/>
+              <a:t>There will probably not be a winner take all system</a:t>
+            </a:r>
+            <a:endParaRPr lang="en-US" dirty="0"/>
+          </a:p>
+        </p:txBody>
+      </p:sp>
+      <p:sp>
+        <p:nvSpPr>
+          <p:cNvPr id="3" name="Content Placeholder 2"/>
+          <p:cNvSpPr>
+            <a:spLocks noGrp="1"/>
+          </p:cNvSpPr>
+          <p:nvPr>
+            <p:ph idx="1"/>
+          </p:nvPr>
+        </p:nvSpPr>
+        <p:spPr/>
+        <p:txBody>
+          <a:bodyPr>
+            <a:normAutofit fontScale="92500" lnSpcReduction="10000"/>
+          </a:bodyPr>
+          <a:lstStyle/>
+          <a:p>
+            <a:r>
+              <a:rPr lang="en-US" dirty="0" smtClean="0"/>
+              <a:t>First go over scalability </a:t>
+            </a:r>
+            <a:r>
+              <a:rPr lang="en-US" dirty="0" err="1" smtClean="0"/>
+              <a:t>trilemma</a:t>
+            </a:r>
+            <a:r>
+              <a:rPr lang="en-US" dirty="0" smtClean="0"/>
+              <a:t> and emphasize decentralization </a:t>
+            </a:r>
+            <a:r>
+              <a:rPr lang="mr-IN" dirty="0" smtClean="0"/>
+              <a:t>–</a:t>
+            </a:r>
+            <a:r>
+              <a:rPr lang="en-US" dirty="0" smtClean="0"/>
+              <a:t> scalability tradeoff</a:t>
+            </a:r>
+          </a:p>
+          <a:p>
+            <a:r>
+              <a:rPr lang="en-US" dirty="0" smtClean="0"/>
+              <a:t>Go Over Roles</a:t>
+            </a:r>
+          </a:p>
+          <a:p>
+            <a:pPr lvl="1"/>
+            <a:r>
+              <a:rPr lang="en-US" dirty="0" smtClean="0"/>
+              <a:t>Bitcoin for money, store of value; backwards </a:t>
+            </a:r>
+            <a:r>
+              <a:rPr lang="en-US" dirty="0" err="1" smtClean="0"/>
+              <a:t>compatibilit</a:t>
+            </a:r>
+            <a:r>
+              <a:rPr lang="en-US" dirty="0" smtClean="0"/>
+              <a:t>; immutability</a:t>
+            </a:r>
+          </a:p>
+          <a:p>
+            <a:pPr lvl="1"/>
+            <a:r>
+              <a:rPr lang="en-US" dirty="0" smtClean="0"/>
+              <a:t>Ethereum for </a:t>
+            </a:r>
+            <a:r>
+              <a:rPr lang="en-US" dirty="0" err="1" smtClean="0"/>
+              <a:t>dapps</a:t>
+            </a:r>
+            <a:endParaRPr lang="en-US" dirty="0" smtClean="0"/>
+          </a:p>
+          <a:p>
+            <a:pPr lvl="1"/>
+            <a:r>
+              <a:rPr lang="en-US" dirty="0" err="1" smtClean="0"/>
+              <a:t>Dfinity</a:t>
+            </a:r>
+            <a:r>
+              <a:rPr lang="en-US" dirty="0" smtClean="0"/>
+              <a:t>: scalable computation</a:t>
+            </a:r>
+          </a:p>
+          <a:p>
+            <a:pPr lvl="1"/>
+            <a:r>
+              <a:rPr lang="en-US" dirty="0" smtClean="0"/>
+              <a:t>EOS for federated decentralization</a:t>
+            </a:r>
+          </a:p>
+          <a:p>
+            <a:pPr lvl="1"/>
+            <a:r>
+              <a:rPr lang="en-US" dirty="0">
+                <a:hlinkClick r:id="rId2"/>
+              </a:rPr>
+              <a:t>https://multicoin.capital/2018/04/24/eos-analysis-and-valuation</a:t>
+            </a:r>
+            <a:r>
+              <a:rPr lang="en-US" dirty="0" smtClean="0">
+                <a:hlinkClick r:id="rId2"/>
+              </a:rPr>
+              <a:t>/</a:t>
+            </a:r>
+            <a:endParaRPr lang="en-US" dirty="0" smtClean="0"/>
+          </a:p>
+          <a:p>
+            <a:pPr lvl="1"/>
+            <a:endParaRPr lang="en-US" dirty="0"/>
           </a:p>
         </p:txBody>
       </p:sp>
@@ -3408,7 +3591,7 @@
 </p:sld>
 </file>
 
-<file path=ppt/slides/slide13.xml><?xml version="1.0" encoding="utf-8"?>
+<file path=ppt/slides/slide14.xml><?xml version="1.0" encoding="utf-8"?>
 <p:sld xmlns:a="http://schemas.openxmlformats.org/drawingml/2006/main" xmlns:r="http://schemas.openxmlformats.org/officeDocument/2006/relationships" xmlns:p="http://schemas.openxmlformats.org/presentationml/2006/main">
   <p:cSld>
     <p:spTree>
@@ -4747,6 +4930,42 @@
           </a:p>
         </p:txBody>
       </p:sp>
+      <p:pic>
+        <p:nvPicPr>
+          <p:cNvPr id="4" name="Picture 3" descr="flash-2568381_1920-1.jpg"/>
+          <p:cNvPicPr>
+            <a:picLocks noChangeAspect="1"/>
+          </p:cNvPicPr>
+          <p:nvPr/>
+        </p:nvPicPr>
+        <p:blipFill>
+          <a:blip r:embed="rId2">
+            <a:extLst>
+              <a:ext uri="{28A0092B-C50C-407E-A947-70E740481C1C}">
+                <a14:useLocalDpi xmlns:a14="http://schemas.microsoft.com/office/drawing/2010/main" val="0"/>
+              </a:ext>
+            </a:extLst>
+          </a:blip>
+          <a:stretch>
+            <a:fillRect/>
+          </a:stretch>
+        </p:blipFill>
+        <p:spPr>
+          <a:xfrm>
+            <a:off x="4062510" y="1417638"/>
+            <a:ext cx="4827158" cy="3218105"/>
+          </a:xfrm>
+          <a:prstGeom prst="rect">
+            <a:avLst/>
+          </a:prstGeom>
+          <a:ln>
+            <a:noFill/>
+          </a:ln>
+          <a:effectLst>
+            <a:softEdge rad="112500"/>
+          </a:effectLst>
+        </p:spPr>
+      </p:pic>
     </p:spTree>
     <p:extLst>
       <p:ext uri="{BB962C8B-B14F-4D97-AF65-F5344CB8AC3E}">

</xml_diff>